<commit_message>
está mal la base de datos de Antonio :c
</commit_message>
<xml_diff>
--- a/Analisis Antonio/Graficas.pptx
+++ b/Analisis Antonio/Graficas.pptx
@@ -107,6 +107,11 @@
       </a:defRPr>
     </a:lvl9pPr>
   </p:defaultTextStyle>
+  <p:extLst>
+    <p:ext uri="{EFAFB233-063F-42B5-8137-9DF3F51BA10A}">
+      <p15:sldGuideLst xmlns:p15="http://schemas.microsoft.com/office/powerpoint/2012/main"/>
+    </p:ext>
+  </p:extLst>
 </p:presentation>
 </file>
 
@@ -259,7 +264,7 @@
           <a:p>
             <a:fld id="{656CC5B3-A802-4A30-AC1D-E2239D062B86}" type="datetimeFigureOut">
               <a:rPr lang="es-MX" smtClean="0"/>
-              <a:t>14/09/2023</a:t>
+              <a:t>15/09/2023</a:t>
             </a:fld>
             <a:endParaRPr lang="es-MX"/>
           </a:p>
@@ -459,7 +464,7 @@
           <a:p>
             <a:fld id="{656CC5B3-A802-4A30-AC1D-E2239D062B86}" type="datetimeFigureOut">
               <a:rPr lang="es-MX" smtClean="0"/>
-              <a:t>14/09/2023</a:t>
+              <a:t>15/09/2023</a:t>
             </a:fld>
             <a:endParaRPr lang="es-MX"/>
           </a:p>
@@ -669,7 +674,7 @@
           <a:p>
             <a:fld id="{656CC5B3-A802-4A30-AC1D-E2239D062B86}" type="datetimeFigureOut">
               <a:rPr lang="es-MX" smtClean="0"/>
-              <a:t>14/09/2023</a:t>
+              <a:t>15/09/2023</a:t>
             </a:fld>
             <a:endParaRPr lang="es-MX"/>
           </a:p>
@@ -869,7 +874,7 @@
           <a:p>
             <a:fld id="{656CC5B3-A802-4A30-AC1D-E2239D062B86}" type="datetimeFigureOut">
               <a:rPr lang="es-MX" smtClean="0"/>
-              <a:t>14/09/2023</a:t>
+              <a:t>15/09/2023</a:t>
             </a:fld>
             <a:endParaRPr lang="es-MX"/>
           </a:p>
@@ -1145,7 +1150,7 @@
           <a:p>
             <a:fld id="{656CC5B3-A802-4A30-AC1D-E2239D062B86}" type="datetimeFigureOut">
               <a:rPr lang="es-MX" smtClean="0"/>
-              <a:t>14/09/2023</a:t>
+              <a:t>15/09/2023</a:t>
             </a:fld>
             <a:endParaRPr lang="es-MX"/>
           </a:p>
@@ -1413,7 +1418,7 @@
           <a:p>
             <a:fld id="{656CC5B3-A802-4A30-AC1D-E2239D062B86}" type="datetimeFigureOut">
               <a:rPr lang="es-MX" smtClean="0"/>
-              <a:t>14/09/2023</a:t>
+              <a:t>15/09/2023</a:t>
             </a:fld>
             <a:endParaRPr lang="es-MX"/>
           </a:p>
@@ -1828,7 +1833,7 @@
           <a:p>
             <a:fld id="{656CC5B3-A802-4A30-AC1D-E2239D062B86}" type="datetimeFigureOut">
               <a:rPr lang="es-MX" smtClean="0"/>
-              <a:t>14/09/2023</a:t>
+              <a:t>15/09/2023</a:t>
             </a:fld>
             <a:endParaRPr lang="es-MX"/>
           </a:p>
@@ -1970,7 +1975,7 @@
           <a:p>
             <a:fld id="{656CC5B3-A802-4A30-AC1D-E2239D062B86}" type="datetimeFigureOut">
               <a:rPr lang="es-MX" smtClean="0"/>
-              <a:t>14/09/2023</a:t>
+              <a:t>15/09/2023</a:t>
             </a:fld>
             <a:endParaRPr lang="es-MX"/>
           </a:p>
@@ -2083,7 +2088,7 @@
           <a:p>
             <a:fld id="{656CC5B3-A802-4A30-AC1D-E2239D062B86}" type="datetimeFigureOut">
               <a:rPr lang="es-MX" smtClean="0"/>
-              <a:t>14/09/2023</a:t>
+              <a:t>15/09/2023</a:t>
             </a:fld>
             <a:endParaRPr lang="es-MX"/>
           </a:p>
@@ -2396,7 +2401,7 @@
           <a:p>
             <a:fld id="{656CC5B3-A802-4A30-AC1D-E2239D062B86}" type="datetimeFigureOut">
               <a:rPr lang="es-MX" smtClean="0"/>
-              <a:t>14/09/2023</a:t>
+              <a:t>15/09/2023</a:t>
             </a:fld>
             <a:endParaRPr lang="es-MX"/>
           </a:p>
@@ -2685,7 +2690,7 @@
           <a:p>
             <a:fld id="{656CC5B3-A802-4A30-AC1D-E2239D062B86}" type="datetimeFigureOut">
               <a:rPr lang="es-MX" smtClean="0"/>
-              <a:t>14/09/2023</a:t>
+              <a:t>15/09/2023</a:t>
             </a:fld>
             <a:endParaRPr lang="es-MX"/>
           </a:p>
@@ -2928,7 +2933,7 @@
           <a:p>
             <a:fld id="{656CC5B3-A802-4A30-AC1D-E2239D062B86}" type="datetimeFigureOut">
               <a:rPr lang="es-MX" smtClean="0"/>
-              <a:t>14/09/2023</a:t>
+              <a:t>15/09/2023</a:t>
             </a:fld>
             <a:endParaRPr lang="es-MX"/>
           </a:p>
@@ -3724,10 +3729,10 @@
       </p:pic>
       <p:pic>
         <p:nvPicPr>
-          <p:cNvPr id="9" name="Imagen 8">
-            <a:extLst>
-              <a:ext uri="{FF2B5EF4-FFF2-40B4-BE49-F238E27FC236}">
-                <a16:creationId xmlns:a16="http://schemas.microsoft.com/office/drawing/2014/main" id="{B6349D2F-F7CB-D556-FD56-9D0D595236CF}"/>
+          <p:cNvPr id="2" name="Imagen 1">
+            <a:extLst>
+              <a:ext uri="{FF2B5EF4-FFF2-40B4-BE49-F238E27FC236}">
+                <a16:creationId xmlns:a16="http://schemas.microsoft.com/office/drawing/2014/main" id="{EDE2D573-5F21-E29B-E65E-03B0F2837E3D}"/>
               </a:ext>
             </a:extLst>
           </p:cNvPr>
@@ -3744,8 +3749,8 @@
         </p:blipFill>
         <p:spPr>
           <a:xfrm>
-            <a:off x="3502770" y="3559049"/>
-            <a:ext cx="4185653" cy="3006414"/>
+            <a:off x="3634902" y="3429000"/>
+            <a:ext cx="4180793" cy="3222695"/>
           </a:xfrm>
           <a:prstGeom prst="rect">
             <a:avLst/>

</xml_diff>